<commit_message>
Add attribution to relevant documents on front page
</commit_message>
<xml_diff>
--- a/JetBrains-MPS-generators.pptx
+++ b/JetBrains-MPS-generators.pptx
@@ -172,6 +172,11 @@
       </a:defRPr>
     </a:lvl9pPr>
   </p:defaultTextStyle>
+  <p:extLst>
+    <p:ext uri="{EFAFB233-063F-42B5-8137-9DF3F51BA10A}">
+      <p15:sldGuideLst xmlns:p15="http://schemas.microsoft.com/office/powerpoint/2012/main"/>
+    </p:ext>
+  </p:extLst>
 </p:presentation>
 </file>
 
@@ -257,7 +262,7 @@
           <a:p>
             <a:fld id="{E5432C85-8A36-40FC-8043-5A0FE15E8FD8}" type="datetimeFigureOut">
               <a:rPr lang="nl-NL" smtClean="0"/>
-              <a:t>22-9-2018</a:t>
+              <a:t>23-9-2018</a:t>
             </a:fld>
             <a:endParaRPr lang="nl-NL"/>
           </a:p>
@@ -761,7 +766,7 @@
           <a:p>
             <a:fld id="{8E671106-4F6D-43E7-A9BE-4064156D9F20}" type="datetimeFigureOut">
               <a:rPr lang="nl-NL" smtClean="0"/>
-              <a:t>22-9-2018</a:t>
+              <a:t>23-9-2018</a:t>
             </a:fld>
             <a:endParaRPr lang="nl-NL"/>
           </a:p>
@@ -961,7 +966,7 @@
           <a:p>
             <a:fld id="{8E671106-4F6D-43E7-A9BE-4064156D9F20}" type="datetimeFigureOut">
               <a:rPr lang="nl-NL" smtClean="0"/>
-              <a:t>22-9-2018</a:t>
+              <a:t>23-9-2018</a:t>
             </a:fld>
             <a:endParaRPr lang="nl-NL"/>
           </a:p>
@@ -1171,7 +1176,7 @@
           <a:p>
             <a:fld id="{8E671106-4F6D-43E7-A9BE-4064156D9F20}" type="datetimeFigureOut">
               <a:rPr lang="nl-NL" smtClean="0"/>
-              <a:t>22-9-2018</a:t>
+              <a:t>23-9-2018</a:t>
             </a:fld>
             <a:endParaRPr lang="nl-NL"/>
           </a:p>
@@ -1371,7 +1376,7 @@
           <a:p>
             <a:fld id="{8E671106-4F6D-43E7-A9BE-4064156D9F20}" type="datetimeFigureOut">
               <a:rPr lang="nl-NL" smtClean="0"/>
-              <a:t>22-9-2018</a:t>
+              <a:t>23-9-2018</a:t>
             </a:fld>
             <a:endParaRPr lang="nl-NL"/>
           </a:p>
@@ -1647,7 +1652,7 @@
           <a:p>
             <a:fld id="{8E671106-4F6D-43E7-A9BE-4064156D9F20}" type="datetimeFigureOut">
               <a:rPr lang="nl-NL" smtClean="0"/>
-              <a:t>22-9-2018</a:t>
+              <a:t>23-9-2018</a:t>
             </a:fld>
             <a:endParaRPr lang="nl-NL"/>
           </a:p>
@@ -1915,7 +1920,7 @@
           <a:p>
             <a:fld id="{8E671106-4F6D-43E7-A9BE-4064156D9F20}" type="datetimeFigureOut">
               <a:rPr lang="nl-NL" smtClean="0"/>
-              <a:t>22-9-2018</a:t>
+              <a:t>23-9-2018</a:t>
             </a:fld>
             <a:endParaRPr lang="nl-NL"/>
           </a:p>
@@ -2330,7 +2335,7 @@
           <a:p>
             <a:fld id="{8E671106-4F6D-43E7-A9BE-4064156D9F20}" type="datetimeFigureOut">
               <a:rPr lang="nl-NL" smtClean="0"/>
-              <a:t>22-9-2018</a:t>
+              <a:t>23-9-2018</a:t>
             </a:fld>
             <a:endParaRPr lang="nl-NL"/>
           </a:p>
@@ -2472,7 +2477,7 @@
           <a:p>
             <a:fld id="{8E671106-4F6D-43E7-A9BE-4064156D9F20}" type="datetimeFigureOut">
               <a:rPr lang="nl-NL" smtClean="0"/>
-              <a:t>22-9-2018</a:t>
+              <a:t>23-9-2018</a:t>
             </a:fld>
             <a:endParaRPr lang="nl-NL"/>
           </a:p>
@@ -2585,7 +2590,7 @@
           <a:p>
             <a:fld id="{8E671106-4F6D-43E7-A9BE-4064156D9F20}" type="datetimeFigureOut">
               <a:rPr lang="nl-NL" smtClean="0"/>
-              <a:t>22-9-2018</a:t>
+              <a:t>23-9-2018</a:t>
             </a:fld>
             <a:endParaRPr lang="nl-NL"/>
           </a:p>
@@ -2898,7 +2903,7 @@
           <a:p>
             <a:fld id="{8E671106-4F6D-43E7-A9BE-4064156D9F20}" type="datetimeFigureOut">
               <a:rPr lang="nl-NL" smtClean="0"/>
-              <a:t>22-9-2018</a:t>
+              <a:t>23-9-2018</a:t>
             </a:fld>
             <a:endParaRPr lang="nl-NL"/>
           </a:p>
@@ -3187,7 +3192,7 @@
           <a:p>
             <a:fld id="{8E671106-4F6D-43E7-A9BE-4064156D9F20}" type="datetimeFigureOut">
               <a:rPr lang="nl-NL" smtClean="0"/>
-              <a:t>22-9-2018</a:t>
+              <a:t>23-9-2018</a:t>
             </a:fld>
             <a:endParaRPr lang="nl-NL"/>
           </a:p>
@@ -3430,7 +3435,7 @@
           <a:p>
             <a:fld id="{8E671106-4F6D-43E7-A9BE-4064156D9F20}" type="datetimeFigureOut">
               <a:rPr lang="nl-NL" smtClean="0"/>
-              <a:t>22-9-2018</a:t>
+              <a:t>23-9-2018</a:t>
             </a:fld>
             <a:endParaRPr lang="nl-NL"/>
           </a:p>
@@ -3924,8 +3929,8 @@
         </p:nvSpPr>
         <p:spPr>
           <a:xfrm>
-            <a:off x="1534160" y="4353878"/>
-            <a:ext cx="9144000" cy="1655762"/>
+            <a:off x="843280" y="4353878"/>
+            <a:ext cx="10525760" cy="1655762"/>
           </a:xfrm>
           <a:prstGeom prst="rect">
             <a:avLst/>
@@ -4102,7 +4107,27 @@
           <a:p>
             <a:r>
               <a:rPr lang="nl-NL" sz="1600" dirty="0"/>
-              <a:t>Inspired by the MPS user manual and the “building maintainable generators” guide from Itemis</a:t>
+              <a:t>Heavily inspired by </a:t>
+            </a:r>
+            <a:r>
+              <a:rPr lang="nl-NL" sz="1600" dirty="0">
+                <a:hlinkClick r:id="rId2"/>
+              </a:rPr>
+              <a:t>the MPS generators user manual </a:t>
+            </a:r>
+            <a:r>
+              <a:rPr lang="nl-NL" sz="1600" dirty="0"/>
+              <a:t>and the </a:t>
+            </a:r>
+            <a:r>
+              <a:rPr lang="nl-NL" sz="1600" dirty="0">
+                <a:hlinkClick r:id="rId3"/>
+              </a:rPr>
+              <a:t>“building maintainable generators” guide </a:t>
+            </a:r>
+            <a:r>
+              <a:rPr lang="nl-NL" sz="1600" dirty="0"/>
+              <a:t>from Itemis (@coolya)</a:t>
             </a:r>
           </a:p>
         </p:txBody>

</xml_diff>

<commit_message>
Add remark about using smodel queries instead of mapping labels, based on remark from @klemensschindler
</commit_message>
<xml_diff>
--- a/JetBrains-MPS-generators.pptx
+++ b/JetBrains-MPS-generators.pptx
@@ -262,7 +262,7 @@
           <a:p>
             <a:fld id="{E5432C85-8A36-40FC-8043-5A0FE15E8FD8}" type="datetimeFigureOut">
               <a:rPr lang="nl-NL" smtClean="0"/>
-              <a:t>23-9-2018</a:t>
+              <a:t>30-10-2018</a:t>
             </a:fld>
             <a:endParaRPr lang="nl-NL"/>
           </a:p>
@@ -766,7 +766,7 @@
           <a:p>
             <a:fld id="{8E671106-4F6D-43E7-A9BE-4064156D9F20}" type="datetimeFigureOut">
               <a:rPr lang="nl-NL" smtClean="0"/>
-              <a:t>23-9-2018</a:t>
+              <a:t>30-10-2018</a:t>
             </a:fld>
             <a:endParaRPr lang="nl-NL"/>
           </a:p>
@@ -966,7 +966,7 @@
           <a:p>
             <a:fld id="{8E671106-4F6D-43E7-A9BE-4064156D9F20}" type="datetimeFigureOut">
               <a:rPr lang="nl-NL" smtClean="0"/>
-              <a:t>23-9-2018</a:t>
+              <a:t>30-10-2018</a:t>
             </a:fld>
             <a:endParaRPr lang="nl-NL"/>
           </a:p>
@@ -1176,7 +1176,7 @@
           <a:p>
             <a:fld id="{8E671106-4F6D-43E7-A9BE-4064156D9F20}" type="datetimeFigureOut">
               <a:rPr lang="nl-NL" smtClean="0"/>
-              <a:t>23-9-2018</a:t>
+              <a:t>30-10-2018</a:t>
             </a:fld>
             <a:endParaRPr lang="nl-NL"/>
           </a:p>
@@ -1376,7 +1376,7 @@
           <a:p>
             <a:fld id="{8E671106-4F6D-43E7-A9BE-4064156D9F20}" type="datetimeFigureOut">
               <a:rPr lang="nl-NL" smtClean="0"/>
-              <a:t>23-9-2018</a:t>
+              <a:t>30-10-2018</a:t>
             </a:fld>
             <a:endParaRPr lang="nl-NL"/>
           </a:p>
@@ -1652,7 +1652,7 @@
           <a:p>
             <a:fld id="{8E671106-4F6D-43E7-A9BE-4064156D9F20}" type="datetimeFigureOut">
               <a:rPr lang="nl-NL" smtClean="0"/>
-              <a:t>23-9-2018</a:t>
+              <a:t>30-10-2018</a:t>
             </a:fld>
             <a:endParaRPr lang="nl-NL"/>
           </a:p>
@@ -1920,7 +1920,7 @@
           <a:p>
             <a:fld id="{8E671106-4F6D-43E7-A9BE-4064156D9F20}" type="datetimeFigureOut">
               <a:rPr lang="nl-NL" smtClean="0"/>
-              <a:t>23-9-2018</a:t>
+              <a:t>30-10-2018</a:t>
             </a:fld>
             <a:endParaRPr lang="nl-NL"/>
           </a:p>
@@ -2335,7 +2335,7 @@
           <a:p>
             <a:fld id="{8E671106-4F6D-43E7-A9BE-4064156D9F20}" type="datetimeFigureOut">
               <a:rPr lang="nl-NL" smtClean="0"/>
-              <a:t>23-9-2018</a:t>
+              <a:t>30-10-2018</a:t>
             </a:fld>
             <a:endParaRPr lang="nl-NL"/>
           </a:p>
@@ -2477,7 +2477,7 @@
           <a:p>
             <a:fld id="{8E671106-4F6D-43E7-A9BE-4064156D9F20}" type="datetimeFigureOut">
               <a:rPr lang="nl-NL" smtClean="0"/>
-              <a:t>23-9-2018</a:t>
+              <a:t>30-10-2018</a:t>
             </a:fld>
             <a:endParaRPr lang="nl-NL"/>
           </a:p>
@@ -2590,7 +2590,7 @@
           <a:p>
             <a:fld id="{8E671106-4F6D-43E7-A9BE-4064156D9F20}" type="datetimeFigureOut">
               <a:rPr lang="nl-NL" smtClean="0"/>
-              <a:t>23-9-2018</a:t>
+              <a:t>30-10-2018</a:t>
             </a:fld>
             <a:endParaRPr lang="nl-NL"/>
           </a:p>
@@ -2903,7 +2903,7 @@
           <a:p>
             <a:fld id="{8E671106-4F6D-43E7-A9BE-4064156D9F20}" type="datetimeFigureOut">
               <a:rPr lang="nl-NL" smtClean="0"/>
-              <a:t>23-9-2018</a:t>
+              <a:t>30-10-2018</a:t>
             </a:fld>
             <a:endParaRPr lang="nl-NL"/>
           </a:p>
@@ -3192,7 +3192,7 @@
           <a:p>
             <a:fld id="{8E671106-4F6D-43E7-A9BE-4064156D9F20}" type="datetimeFigureOut">
               <a:rPr lang="nl-NL" smtClean="0"/>
-              <a:t>23-9-2018</a:t>
+              <a:t>30-10-2018</a:t>
             </a:fld>
             <a:endParaRPr lang="nl-NL"/>
           </a:p>
@@ -3435,7 +3435,7 @@
           <a:p>
             <a:fld id="{8E671106-4F6D-43E7-A9BE-4064156D9F20}" type="datetimeFigureOut">
               <a:rPr lang="nl-NL" smtClean="0"/>
-              <a:t>23-9-2018</a:t>
+              <a:t>30-10-2018</a:t>
             </a:fld>
             <a:endParaRPr lang="nl-NL"/>
           </a:p>
@@ -13254,7 +13254,7 @@
         </p:spPr>
         <p:txBody>
           <a:bodyPr vert="horz" lIns="91440" tIns="45720" rIns="91440" bIns="45720" rtlCol="0">
-            <a:normAutofit fontScale="92500" lnSpcReduction="10000"/>
+            <a:normAutofit fontScale="85000" lnSpcReduction="20000"/>
           </a:bodyPr>
           <a:lstStyle>
             <a:lvl1pPr marL="228600" indent="-228600" algn="l" defTabSz="914400" rtl="0" eaLnBrk="1" latinLnBrk="0" hangingPunct="1">
@@ -13423,8 +13423,27 @@
           <a:p>
             <a:r>
               <a:rPr lang="en-US" dirty="0"/>
-              <a:t>Mapping Labels are declared in a mapping configuration and references stored to this declaration are used to label generator rules, macros and template fragments. Such marks allow finding of an output node by a known input node.</a:t>
-            </a:r>
+              <a:t>Mapping Labels are declared in a mapping configuration and references stored to this declaration are used to label generator rules, macros and template fragments. Such marks allow finding of an output node by a known input node. </a:t>
+            </a:r>
+            <a:r>
+              <a:rPr lang="en-US" dirty="0">
+                <a:sym typeface="Wingdings" panose="05000000000000000000" pitchFamily="2" charset="2"/>
+              </a:rPr>
+              <a:t> N.B.: it’s also possible to lookup things by </a:t>
+            </a:r>
+            <a:r>
+              <a:rPr lang="en-US" dirty="0" err="1">
+                <a:sym typeface="Wingdings" panose="05000000000000000000" pitchFamily="2" charset="2"/>
+              </a:rPr>
+              <a:t>smodel</a:t>
+            </a:r>
+            <a:r>
+              <a:rPr lang="en-US" dirty="0">
+                <a:sym typeface="Wingdings" panose="05000000000000000000" pitchFamily="2" charset="2"/>
+              </a:rPr>
+              <a:t> (if in scope), but mapping labels are most robust</a:t>
+            </a:r>
+            <a:endParaRPr lang="en-US" dirty="0"/>
           </a:p>
         </p:txBody>
       </p:sp>

</xml_diff>